<commit_message>
updating kubeadm install to 1.29
</commit_message>
<xml_diff>
--- a/slides/Kubernetes 101.pptx
+++ b/slides/Kubernetes 101.pptx
@@ -264,7 +264,7 @@
           <a:p>
             <a:fld id="{AFD01546-198A-4195-BCF8-F0FF54C90E5E}" type="datetimeFigureOut">
               <a:rPr lang="en-US" smtClean="0"/>
-              <a:t>5/23/2023</a:t>
+              <a:t>3/20/2024</a:t>
             </a:fld>
             <a:endParaRPr lang="en-US" dirty="0"/>
           </a:p>
@@ -860,7 +860,7 @@
           <a:p>
             <a:fld id="{88D38747-4367-4BD2-8D51-C97E202738E2}" type="datetime1">
               <a:rPr lang="en-US" smtClean="0"/>
-              <a:t>5/23/2023</a:t>
+              <a:t>3/20/2024</a:t>
             </a:fld>
             <a:endParaRPr lang="en-US" dirty="0"/>
           </a:p>
@@ -1165,7 +1165,7 @@
           <a:p>
             <a:fld id="{11F1B079-7EF0-44EE-B798-BCC497C9F3B2}" type="datetime1">
               <a:rPr lang="en-US" smtClean="0"/>
-              <a:t>5/23/2023</a:t>
+              <a:t>3/20/2024</a:t>
             </a:fld>
             <a:endParaRPr lang="en-US" dirty="0"/>
           </a:p>
@@ -1359,7 +1359,7 @@
           <a:p>
             <a:fld id="{28FF70A8-1D13-4657-95F0-A9EA54967B8D}" type="datetime1">
               <a:rPr lang="en-US" smtClean="0"/>
-              <a:t>5/23/2023</a:t>
+              <a:t>3/20/2024</a:t>
             </a:fld>
             <a:endParaRPr lang="en-US" dirty="0"/>
           </a:p>
@@ -1622,7 +1622,7 @@
           <a:p>
             <a:fld id="{21EB90AC-71BD-4C7F-8ACA-7B3F18292E63}" type="datetime1">
               <a:rPr lang="en-US" smtClean="0"/>
-              <a:t>5/23/2023</a:t>
+              <a:t>3/20/2024</a:t>
             </a:fld>
             <a:endParaRPr lang="en-US" dirty="0"/>
           </a:p>
@@ -2058,7 +2058,7 @@
           <a:p>
             <a:fld id="{4E6EFC2C-8905-46F0-B443-CE905B76BA01}" type="datetime1">
               <a:rPr lang="en-US" smtClean="0"/>
-              <a:t>5/23/2023</a:t>
+              <a:t>3/20/2024</a:t>
             </a:fld>
             <a:endParaRPr lang="en-US" dirty="0"/>
           </a:p>
@@ -2595,7 +2595,7 @@
           <a:p>
             <a:fld id="{D9079DC3-C9B5-499E-9140-0DC28B7074E2}" type="datetime1">
               <a:rPr lang="en-US" smtClean="0"/>
-              <a:t>5/23/2023</a:t>
+              <a:t>3/20/2024</a:t>
             </a:fld>
             <a:endParaRPr lang="en-US" dirty="0"/>
           </a:p>
@@ -3477,7 +3477,7 @@
           <a:p>
             <a:fld id="{30BB33EA-E472-4D22-9C03-A9C14AA21CED}" type="datetime1">
               <a:rPr lang="en-US" smtClean="0"/>
-              <a:t>5/23/2023</a:t>
+              <a:t>3/20/2024</a:t>
             </a:fld>
             <a:endParaRPr lang="en-US" dirty="0"/>
           </a:p>
@@ -3647,7 +3647,7 @@
           <a:p>
             <a:fld id="{73C55A3C-5767-4844-A0A3-83778C2E5409}" type="datetime1">
               <a:rPr lang="en-US" smtClean="0"/>
-              <a:t>5/23/2023</a:t>
+              <a:t>3/20/2024</a:t>
             </a:fld>
             <a:endParaRPr lang="en-US" dirty="0"/>
           </a:p>
@@ -3891,7 +3891,7 @@
           <a:p>
             <a:fld id="{CAE507A8-A5CF-4D38-AB86-7EDDA87A85D4}" type="datetime1">
               <a:rPr lang="en-US" smtClean="0"/>
-              <a:t>5/23/2023</a:t>
+              <a:t>3/20/2024</a:t>
             </a:fld>
             <a:endParaRPr lang="en-US" dirty="0"/>
           </a:p>
@@ -4133,7 +4133,7 @@
           <a:p>
             <a:fld id="{BDFCD27C-8599-43EF-BA1D-14DDC1946E06}" type="datetime1">
               <a:rPr lang="en-US" smtClean="0"/>
-              <a:t>5/23/2023</a:t>
+              <a:t>3/20/2024</a:t>
             </a:fld>
             <a:endParaRPr lang="en-US" dirty="0"/>
           </a:p>
@@ -4616,7 +4616,7 @@
           <a:p>
             <a:fld id="{49343D99-809A-49C0-96E5-4250D0B498EE}" type="datetime1">
               <a:rPr lang="en-US" smtClean="0"/>
-              <a:t>5/23/2023</a:t>
+              <a:t>3/20/2024</a:t>
             </a:fld>
             <a:endParaRPr lang="en-US" dirty="0"/>
           </a:p>
@@ -4734,7 +4734,7 @@
           <a:p>
             <a:fld id="{A143DE9B-B678-4EFB-BB7D-A4370204A0B0}" type="datetime1">
               <a:rPr lang="en-US" smtClean="0"/>
-              <a:t>5/23/2023</a:t>
+              <a:t>3/20/2024</a:t>
             </a:fld>
             <a:endParaRPr lang="en-US" dirty="0"/>
           </a:p>
@@ -4829,7 +4829,7 @@
           <a:p>
             <a:fld id="{E68812DA-F765-4142-A6A3-A8ED7235E082}" type="datetime1">
               <a:rPr lang="en-US" smtClean="0"/>
-              <a:t>5/23/2023</a:t>
+              <a:t>3/20/2024</a:t>
             </a:fld>
             <a:endParaRPr lang="en-US" dirty="0"/>
           </a:p>
@@ -5084,7 +5084,7 @@
           <a:p>
             <a:fld id="{3E0277FD-7DE6-41D4-930D-AC99F5AFE54E}" type="datetime1">
               <a:rPr lang="en-US" smtClean="0"/>
-              <a:t>5/23/2023</a:t>
+              <a:t>3/20/2024</a:t>
             </a:fld>
             <a:endParaRPr lang="en-US" dirty="0"/>
           </a:p>
@@ -5391,7 +5391,7 @@
           <a:p>
             <a:fld id="{9EA15526-7079-4B7B-987C-1B5FAE11A0FF}" type="datetime1">
               <a:rPr lang="en-US" smtClean="0"/>
-              <a:t>5/23/2023</a:t>
+              <a:t>3/20/2024</a:t>
             </a:fld>
             <a:endParaRPr lang="en-US" dirty="0"/>
           </a:p>
@@ -5626,7 +5626,7 @@
           <a:p>
             <a:fld id="{073ED0CC-082F-4160-86E5-0D6041F12778}" type="datetime1">
               <a:rPr lang="en-US" smtClean="0"/>
-              <a:t>5/23/2023</a:t>
+              <a:t>3/20/2024</a:t>
             </a:fld>
             <a:endParaRPr lang="en-US" dirty="0"/>
           </a:p>
@@ -6544,7 +6544,7 @@
           </a:effectLst>
           <a:extLst>
             <a:ext uri="{91240B29-F687-4f45-9708-019B960494DF}">
-              <a14:hiddenLine xmlns:a16="http://schemas.microsoft.com/office/drawing/2014/main" xmlns:p14="http://schemas.microsoft.com/office/powerpoint/2010/main" xmlns:a14="http://schemas.microsoft.com/office/drawing/2010/main" xmlns="" w="9525">
+              <a14:hiddenLine xmlns="" xmlns:a14="http://schemas.microsoft.com/office/drawing/2010/main" xmlns:p14="http://schemas.microsoft.com/office/powerpoint/2010/main" xmlns:a16="http://schemas.microsoft.com/office/drawing/2014/main" w="9525">
                 <a:solidFill>
                   <a:srgbClr val="000000"/>
                 </a:solidFill>
@@ -19053,7 +19053,12 @@
             <p:ph type="title"/>
           </p:nvPr>
         </p:nvSpPr>
-        <p:spPr/>
+        <p:spPr>
+          <a:xfrm>
+            <a:off x="826709" y="447874"/>
+            <a:ext cx="10353762" cy="1257300"/>
+          </a:xfrm>
+        </p:spPr>
         <p:txBody>
           <a:bodyPr/>
           <a:lstStyle/>
@@ -21309,24 +21314,6 @@
 </file>
 
 <file path=customXml/item1.xml><?xml version="1.0" encoding="utf-8"?>
-<?mso-contentType ?>
-<FormTemplates xmlns="http://schemas.microsoft.com/sharepoint/v3/contenttype/forms">
-  <Display>DocumentLibraryForm</Display>
-  <Edit>DocumentLibraryForm</Edit>
-  <New>DocumentLibraryForm</New>
-</FormTemplates>
-</file>
-
-<file path=customXml/item2.xml><?xml version="1.0" encoding="utf-8"?>
-<p:properties xmlns:p="http://schemas.microsoft.com/office/2006/metadata/properties" xmlns:xsi="http://www.w3.org/2001/XMLSchema-instance" xmlns:pc="http://schemas.microsoft.com/office/infopath/2007/PartnerControls">
-  <documentManagement>
-    <Status xmlns="71af3243-3dd4-4a8d-8c0d-dd76da1f02a5">Not started</Status>
-    <MediaServiceKeyPoints xmlns="71af3243-3dd4-4a8d-8c0d-dd76da1f02a5" xsi:nil="true"/>
-  </documentManagement>
-</p:properties>
-</file>
-
-<file path=customXml/item3.xml><?xml version="1.0" encoding="utf-8"?>
 <ct:contentTypeSchema xmlns:ct="http://schemas.microsoft.com/office/2006/metadata/contentType" xmlns:ma="http://schemas.microsoft.com/office/2006/metadata/properties/metaAttributes" ct:_="" ma:_="" ma:contentTypeName="Document" ma:contentTypeID="0x01010079F111ED35F8CC479449609E8A0923A6" ma:contentTypeVersion="12" ma:contentTypeDescription="Create a new document." ma:contentTypeScope="" ma:versionID="a410dd7f93c95333ffa1b60ed6adedd1">
   <xsd:schema xmlns:xsd="http://www.w3.org/2001/XMLSchema" xmlns:xs="http://www.w3.org/2001/XMLSchema" xmlns:p="http://schemas.microsoft.com/office/2006/metadata/properties" xmlns:ns2="71af3243-3dd4-4a8d-8c0d-dd76da1f02a5" xmlns:ns3="16c05727-aa75-4e4a-9b5f-8a80a1165891" targetNamespace="http://schemas.microsoft.com/office/2006/metadata/properties" ma:root="true" ma:fieldsID="a936d9baba76aa3866493feff160faab" ns2:_="" ns3:_="">
     <xsd:import namespace="71af3243-3dd4-4a8d-8c0d-dd76da1f02a5"/>
@@ -21547,25 +21534,25 @@
 </ct:contentTypeSchema>
 </file>
 
-<file path=customXml/itemProps1.xml><?xml version="1.0" encoding="utf-8"?>
-<ds:datastoreItem xmlns:ds="http://schemas.openxmlformats.org/officeDocument/2006/customXml" ds:itemID="{64B270AB-C138-415C-897E-3C24487DECF1}">
-  <ds:schemaRefs>
-    <ds:schemaRef ds:uri="http://schemas.microsoft.com/sharepoint/v3/contenttype/forms"/>
-  </ds:schemaRefs>
-</ds:datastoreItem>
+<file path=customXml/item2.xml><?xml version="1.0" encoding="utf-8"?>
+<p:properties xmlns:p="http://schemas.microsoft.com/office/2006/metadata/properties" xmlns:xsi="http://www.w3.org/2001/XMLSchema-instance" xmlns:pc="http://schemas.microsoft.com/office/infopath/2007/PartnerControls">
+  <documentManagement>
+    <Status xmlns="71af3243-3dd4-4a8d-8c0d-dd76da1f02a5">Not started</Status>
+    <MediaServiceKeyPoints xmlns="71af3243-3dd4-4a8d-8c0d-dd76da1f02a5" xsi:nil="true"/>
+  </documentManagement>
+</p:properties>
 </file>
 
-<file path=customXml/itemProps2.xml><?xml version="1.0" encoding="utf-8"?>
-<ds:datastoreItem xmlns:ds="http://schemas.openxmlformats.org/officeDocument/2006/customXml" ds:itemID="{2C4C00F4-06E9-43E3-AD97-88A857CEFA82}">
-  <ds:schemaRefs>
-    <ds:schemaRef ds:uri="http://schemas.microsoft.com/office/2006/metadata/properties"/>
-    <ds:schemaRef ds:uri="http://schemas.microsoft.com/office/infopath/2007/PartnerControls"/>
-    <ds:schemaRef ds:uri="71af3243-3dd4-4a8d-8c0d-dd76da1f02a5"/>
-  </ds:schemaRefs>
-</ds:datastoreItem>
+<file path=customXml/item3.xml><?xml version="1.0" encoding="utf-8"?>
+<?mso-contentType ?>
+<FormTemplates xmlns="http://schemas.microsoft.com/sharepoint/v3/contenttype/forms">
+  <Display>DocumentLibraryForm</Display>
+  <Edit>DocumentLibraryForm</Edit>
+  <New>DocumentLibraryForm</New>
+</FormTemplates>
 </file>
 
-<file path=customXml/itemProps3.xml><?xml version="1.0" encoding="utf-8"?>
+<file path=customXml/itemProps1.xml><?xml version="1.0" encoding="utf-8"?>
 <ds:datastoreItem xmlns:ds="http://schemas.openxmlformats.org/officeDocument/2006/customXml" ds:itemID="{0585E981-8C91-4205-A0C3-C991F42B4C9E}">
   <ds:schemaRefs>
     <ds:schemaRef ds:uri="http://schemas.microsoft.com/office/2006/metadata/contentType"/>
@@ -21582,4 +21569,29 @@
     <ds:schemaRef ds:uri="http://schemas.microsoft.com/internal/obd"/>
   </ds:schemaRefs>
 </ds:datastoreItem>
+</file>
+
+<file path=customXml/itemProps2.xml><?xml version="1.0" encoding="utf-8"?>
+<ds:datastoreItem xmlns:ds="http://schemas.openxmlformats.org/officeDocument/2006/customXml" ds:itemID="{2C4C00F4-06E9-43E3-AD97-88A857CEFA82}">
+  <ds:schemaRefs>
+    <ds:schemaRef ds:uri="71af3243-3dd4-4a8d-8c0d-dd76da1f02a5"/>
+    <ds:schemaRef ds:uri="http://schemas.microsoft.com/office/infopath/2007/PartnerControls"/>
+    <ds:schemaRef ds:uri="http://purl.org/dc/terms/"/>
+    <ds:schemaRef ds:uri="http://schemas.microsoft.com/office/2006/metadata/properties"/>
+    <ds:schemaRef ds:uri="http://www.w3.org/XML/1998/namespace"/>
+    <ds:schemaRef ds:uri="http://purl.org/dc/elements/1.1/"/>
+    <ds:schemaRef ds:uri="http://schemas.microsoft.com/office/2006/documentManagement/types"/>
+    <ds:schemaRef ds:uri="http://purl.org/dc/dcmitype/"/>
+    <ds:schemaRef ds:uri="http://schemas.openxmlformats.org/package/2006/metadata/core-properties"/>
+    <ds:schemaRef ds:uri="16c05727-aa75-4e4a-9b5f-8a80a1165891"/>
+  </ds:schemaRefs>
+</ds:datastoreItem>
+</file>
+
+<file path=customXml/itemProps3.xml><?xml version="1.0" encoding="utf-8"?>
+<ds:datastoreItem xmlns:ds="http://schemas.openxmlformats.org/officeDocument/2006/customXml" ds:itemID="{64B270AB-C138-415C-897E-3C24487DECF1}">
+  <ds:schemaRefs>
+    <ds:schemaRef ds:uri="http://schemas.microsoft.com/sharepoint/v3/contenttype/forms"/>
+  </ds:schemaRefs>
+</ds:datastoreItem>
 </file>
</xml_diff>